<commit_message>
Updated Programing style for coding Java
</commit_message>
<xml_diff>
--- a/programing style.pptx
+++ b/programing style.pptx
@@ -6,12 +6,21 @@
   </p:sldMasterIdLst>
   <p:sldIdLst>
     <p:sldId id="256" r:id="rId2"/>
-    <p:sldId id="257" r:id="rId3"/>
-    <p:sldId id="258" r:id="rId4"/>
-    <p:sldId id="259" r:id="rId5"/>
-    <p:sldId id="260" r:id="rId6"/>
-    <p:sldId id="261" r:id="rId7"/>
-    <p:sldId id="262" r:id="rId8"/>
+    <p:sldId id="265" r:id="rId3"/>
+    <p:sldId id="257" r:id="rId4"/>
+    <p:sldId id="258" r:id="rId5"/>
+    <p:sldId id="259" r:id="rId6"/>
+    <p:sldId id="260" r:id="rId7"/>
+    <p:sldId id="261" r:id="rId8"/>
+    <p:sldId id="263" r:id="rId9"/>
+    <p:sldId id="264" r:id="rId10"/>
+    <p:sldId id="266" r:id="rId11"/>
+    <p:sldId id="267" r:id="rId12"/>
+    <p:sldId id="268" r:id="rId13"/>
+    <p:sldId id="269" r:id="rId14"/>
+    <p:sldId id="270" r:id="rId15"/>
+    <p:sldId id="271" r:id="rId16"/>
+    <p:sldId id="262" r:id="rId17"/>
   </p:sldIdLst>
   <p:sldSz cx="9144000" cy="6858000" type="screen4x3"/>
   <p:notesSz cx="6858000" cy="9144000"/>
@@ -3165,7 +3174,6 @@
               <a:rPr lang="en-US" dirty="0" smtClean="0"/>
               <a:t>Bùi Trương Minh Tuấn</a:t>
             </a:r>
-            <a:endParaRPr lang="en-US" dirty="0" smtClean="0"/>
           </a:p>
           <a:p>
             <a:endParaRPr lang="en-US" dirty="0"/>
@@ -3185,7 +3193,1222 @@
 </p:sld>
 </file>
 
+<file path=ppt/slides/slide10.xml><?xml version="1.0" encoding="utf-8"?>
+<p:sld xmlns:a="http://schemas.openxmlformats.org/drawingml/2006/main" xmlns:r="http://schemas.openxmlformats.org/officeDocument/2006/relationships" xmlns:p="http://schemas.openxmlformats.org/presentationml/2006/main">
+  <p:cSld>
+    <p:spTree>
+      <p:nvGrpSpPr>
+        <p:cNvPr id="1" name=""/>
+        <p:cNvGrpSpPr/>
+        <p:nvPr/>
+      </p:nvGrpSpPr>
+      <p:grpSpPr>
+        <a:xfrm>
+          <a:off x="0" y="0"/>
+          <a:ext cx="0" cy="0"/>
+          <a:chOff x="0" y="0"/>
+          <a:chExt cx="0" cy="0"/>
+        </a:xfrm>
+      </p:grpSpPr>
+      <p:sp>
+        <p:nvSpPr>
+          <p:cNvPr id="2" name="Title 1"/>
+          <p:cNvSpPr>
+            <a:spLocks noGrp="1"/>
+          </p:cNvSpPr>
+          <p:nvPr>
+            <p:ph type="title"/>
+          </p:nvPr>
+        </p:nvSpPr>
+        <p:spPr/>
+        <p:txBody>
+          <a:bodyPr/>
+          <a:lstStyle/>
+          <a:p>
+            <a:r>
+              <a:rPr lang="en-US" dirty="0" smtClean="0"/>
+              <a:t>Khoảng trắng</a:t>
+            </a:r>
+            <a:endParaRPr lang="en-US" dirty="0"/>
+          </a:p>
+        </p:txBody>
+      </p:sp>
+      <p:sp>
+        <p:nvSpPr>
+          <p:cNvPr id="3" name="Content Placeholder 2"/>
+          <p:cNvSpPr>
+            <a:spLocks noGrp="1"/>
+          </p:cNvSpPr>
+          <p:nvPr>
+            <p:ph idx="1"/>
+          </p:nvPr>
+        </p:nvSpPr>
+        <p:spPr/>
+        <p:txBody>
+          <a:bodyPr>
+            <a:normAutofit/>
+          </a:bodyPr>
+          <a:lstStyle/>
+          <a:p>
+            <a:r>
+              <a:rPr lang="en-US" sz="1800" dirty="0" smtClean="0"/>
+              <a:t>Ta nên sử dụng 1 dòng trắng trong các trường hợp sau:</a:t>
+            </a:r>
+          </a:p>
+          <a:p>
+            <a:r>
+              <a:rPr lang="en-US" sz="1800" dirty="0" smtClean="0"/>
+              <a:t>Giữa các phương thức với nhau.</a:t>
+            </a:r>
+          </a:p>
+          <a:p>
+            <a:r>
+              <a:rPr lang="en-US" sz="1800" dirty="0" smtClean="0"/>
+              <a:t>Giữa phần khai báo biến cục bộ trong class, interface và phương thức với dòng tiếp theo.</a:t>
+            </a:r>
+          </a:p>
+          <a:p>
+            <a:r>
+              <a:rPr lang="en-US" sz="1800" dirty="0" smtClean="0"/>
+              <a:t>Nên: 					Không nên</a:t>
+            </a:r>
+            <a:endParaRPr lang="en-US" sz="1800" dirty="0"/>
+          </a:p>
+        </p:txBody>
+      </p:sp>
+      <p:pic>
+        <p:nvPicPr>
+          <p:cNvPr id="5" name="Picture 4"/>
+          <p:cNvPicPr>
+            <a:picLocks noChangeAspect="1"/>
+          </p:cNvPicPr>
+          <p:nvPr/>
+        </p:nvPicPr>
+        <p:blipFill>
+          <a:blip r:embed="rId2">
+            <a:extLst>
+              <a:ext uri="{28A0092B-C50C-407E-A947-70E740481C1C}">
+                <a14:useLocalDpi xmlns:a14="http://schemas.microsoft.com/office/drawing/2010/main" val="0"/>
+              </a:ext>
+            </a:extLst>
+          </a:blip>
+          <a:stretch>
+            <a:fillRect/>
+          </a:stretch>
+        </p:blipFill>
+        <p:spPr>
+          <a:xfrm>
+            <a:off x="1143000" y="3429000"/>
+            <a:ext cx="2642257" cy="2143937"/>
+          </a:xfrm>
+          <a:prstGeom prst="rect">
+            <a:avLst/>
+          </a:prstGeom>
+        </p:spPr>
+      </p:pic>
+      <p:pic>
+        <p:nvPicPr>
+          <p:cNvPr id="6" name="Picture 5"/>
+          <p:cNvPicPr>
+            <a:picLocks noChangeAspect="1"/>
+          </p:cNvPicPr>
+          <p:nvPr/>
+        </p:nvPicPr>
+        <p:blipFill>
+          <a:blip r:embed="rId3">
+            <a:extLst>
+              <a:ext uri="{28A0092B-C50C-407E-A947-70E740481C1C}">
+                <a14:useLocalDpi xmlns:a14="http://schemas.microsoft.com/office/drawing/2010/main" val="0"/>
+              </a:ext>
+            </a:extLst>
+          </a:blip>
+          <a:stretch>
+            <a:fillRect/>
+          </a:stretch>
+        </p:blipFill>
+        <p:spPr>
+          <a:xfrm>
+            <a:off x="4572000" y="3429001"/>
+            <a:ext cx="3269196" cy="2091324"/>
+          </a:xfrm>
+          <a:prstGeom prst="rect">
+            <a:avLst/>
+          </a:prstGeom>
+        </p:spPr>
+      </p:pic>
+    </p:spTree>
+    <p:extLst>
+      <p:ext uri="{BB962C8B-B14F-4D97-AF65-F5344CB8AC3E}">
+        <p14:creationId xmlns:p14="http://schemas.microsoft.com/office/powerpoint/2010/main" val="3938854096"/>
+      </p:ext>
+    </p:extLst>
+  </p:cSld>
+  <p:clrMapOvr>
+    <a:masterClrMapping/>
+  </p:clrMapOvr>
+</p:sld>
+</file>
+
+<file path=ppt/slides/slide11.xml><?xml version="1.0" encoding="utf-8"?>
+<p:sld xmlns:a="http://schemas.openxmlformats.org/drawingml/2006/main" xmlns:r="http://schemas.openxmlformats.org/officeDocument/2006/relationships" xmlns:p="http://schemas.openxmlformats.org/presentationml/2006/main">
+  <p:cSld>
+    <p:spTree>
+      <p:nvGrpSpPr>
+        <p:cNvPr id="1" name=""/>
+        <p:cNvGrpSpPr/>
+        <p:nvPr/>
+      </p:nvGrpSpPr>
+      <p:grpSpPr>
+        <a:xfrm>
+          <a:off x="0" y="0"/>
+          <a:ext cx="0" cy="0"/>
+          <a:chOff x="0" y="0"/>
+          <a:chExt cx="0" cy="0"/>
+        </a:xfrm>
+      </p:grpSpPr>
+      <p:sp>
+        <p:nvSpPr>
+          <p:cNvPr id="2" name="Title 1"/>
+          <p:cNvSpPr>
+            <a:spLocks noGrp="1"/>
+          </p:cNvSpPr>
+          <p:nvPr>
+            <p:ph type="title"/>
+          </p:nvPr>
+        </p:nvSpPr>
+        <p:spPr/>
+        <p:txBody>
+          <a:bodyPr/>
+          <a:lstStyle/>
+          <a:p>
+            <a:r>
+              <a:rPr lang="en-US" dirty="0" smtClean="0"/>
+              <a:t>Khoảng trắng</a:t>
+            </a:r>
+            <a:endParaRPr lang="en-US" dirty="0"/>
+          </a:p>
+        </p:txBody>
+      </p:sp>
+      <p:sp>
+        <p:nvSpPr>
+          <p:cNvPr id="3" name="Content Placeholder 2"/>
+          <p:cNvSpPr>
+            <a:spLocks noGrp="1"/>
+          </p:cNvSpPr>
+          <p:nvPr>
+            <p:ph idx="1"/>
+          </p:nvPr>
+        </p:nvSpPr>
+        <p:spPr/>
+        <p:txBody>
+          <a:bodyPr>
+            <a:normAutofit/>
+          </a:bodyPr>
+          <a:lstStyle/>
+          <a:p>
+            <a:r>
+              <a:rPr lang="en-US" sz="1800" dirty="0" smtClean="0"/>
+              <a:t>Nên sử dụng khoảng trắng trong các trường hợp sau:</a:t>
+            </a:r>
+          </a:p>
+          <a:p>
+            <a:pPr lvl="1"/>
+            <a:r>
+              <a:rPr lang="en-US" sz="1400" dirty="0" smtClean="0"/>
+              <a:t>Giữa một từ khóa với dấu ‘()’ sau nó:</a:t>
+            </a:r>
+          </a:p>
+          <a:p>
+            <a:pPr marL="457200" lvl="1" indent="0">
+              <a:buNone/>
+            </a:pPr>
+            <a:r>
+              <a:rPr lang="en-US" sz="1400" dirty="0" smtClean="0"/>
+              <a:t>	If () {</a:t>
+            </a:r>
+          </a:p>
+          <a:p>
+            <a:pPr marL="457200" lvl="1" indent="0">
+              <a:buNone/>
+            </a:pPr>
+            <a:r>
+              <a:rPr lang="en-US" sz="1400" dirty="0"/>
+              <a:t>	</a:t>
+            </a:r>
+            <a:r>
+              <a:rPr lang="en-US" sz="1400" dirty="0" smtClean="0"/>
+              <a:t> ....</a:t>
+            </a:r>
+          </a:p>
+          <a:p>
+            <a:pPr marL="457200" lvl="1" indent="0">
+              <a:buNone/>
+            </a:pPr>
+            <a:r>
+              <a:rPr lang="en-US" sz="1400" dirty="0" smtClean="0"/>
+              <a:t>	}</a:t>
+            </a:r>
+          </a:p>
+          <a:p>
+            <a:pPr lvl="1"/>
+            <a:r>
+              <a:rPr lang="en-US" sz="1400" dirty="0" smtClean="0"/>
+              <a:t>Giữa các biến và toán tử</a:t>
+            </a:r>
+          </a:p>
+          <a:p>
+            <a:pPr lvl="1"/>
+            <a:endParaRPr lang="en-US" sz="1400" dirty="0"/>
+          </a:p>
+          <a:p>
+            <a:pPr lvl="1"/>
+            <a:endParaRPr lang="en-US" sz="1400" dirty="0" smtClean="0"/>
+          </a:p>
+          <a:p>
+            <a:pPr lvl="1"/>
+            <a:endParaRPr lang="en-US" sz="1400" dirty="0"/>
+          </a:p>
+          <a:p>
+            <a:pPr lvl="1"/>
+            <a:endParaRPr lang="en-US" sz="1400" dirty="0" smtClean="0"/>
+          </a:p>
+          <a:p>
+            <a:pPr lvl="1"/>
+            <a:endParaRPr lang="en-US" sz="1400" dirty="0"/>
+          </a:p>
+          <a:p>
+            <a:pPr lvl="1"/>
+            <a:endParaRPr lang="en-US" sz="1400" dirty="0" smtClean="0"/>
+          </a:p>
+          <a:p>
+            <a:pPr lvl="1"/>
+            <a:r>
+              <a:rPr lang="en-US" sz="1400" dirty="0" smtClean="0"/>
+              <a:t>Tráng sử dụng khoảng trắng giữa toán tử ‘++’ với biến trươc nó ;</a:t>
+            </a:r>
+          </a:p>
+          <a:p>
+            <a:pPr lvl="1"/>
+            <a:r>
+              <a:rPr lang="en-US" sz="1400" dirty="0" smtClean="0"/>
+              <a:t>Nên: i++ ;</a:t>
+            </a:r>
+          </a:p>
+          <a:p>
+            <a:pPr lvl="1"/>
+            <a:r>
+              <a:rPr lang="en-US" sz="1400" dirty="0" smtClean="0"/>
+              <a:t>Không nên: i ++ ;</a:t>
+            </a:r>
+          </a:p>
+          <a:p>
+            <a:pPr marL="457200" lvl="1" indent="0">
+              <a:buNone/>
+            </a:pPr>
+            <a:endParaRPr lang="en-US" sz="1400" dirty="0"/>
+          </a:p>
+          <a:p>
+            <a:pPr marL="457200" lvl="1" indent="0">
+              <a:buNone/>
+            </a:pPr>
+            <a:endParaRPr lang="en-US" sz="1400" dirty="0" smtClean="0"/>
+          </a:p>
+          <a:p>
+            <a:pPr marL="457200" lvl="1" indent="0">
+              <a:buNone/>
+            </a:pPr>
+            <a:endParaRPr lang="en-US" sz="1400" dirty="0"/>
+          </a:p>
+          <a:p>
+            <a:pPr marL="457200" lvl="1" indent="0">
+              <a:buNone/>
+            </a:pPr>
+            <a:endParaRPr lang="en-US" sz="1400" dirty="0" smtClean="0"/>
+          </a:p>
+          <a:p>
+            <a:pPr marL="457200" lvl="1" indent="0">
+              <a:buNone/>
+            </a:pPr>
+            <a:endParaRPr lang="en-US" sz="1400" dirty="0" smtClean="0"/>
+          </a:p>
+        </p:txBody>
+      </p:sp>
+      <p:pic>
+        <p:nvPicPr>
+          <p:cNvPr id="9" name="Picture 8"/>
+          <p:cNvPicPr>
+            <a:picLocks noChangeAspect="1"/>
+          </p:cNvPicPr>
+          <p:nvPr/>
+        </p:nvPicPr>
+        <p:blipFill>
+          <a:blip r:embed="rId2">
+            <a:extLst>
+              <a:ext uri="{28A0092B-C50C-407E-A947-70E740481C1C}">
+                <a14:useLocalDpi xmlns:a14="http://schemas.microsoft.com/office/drawing/2010/main" val="0"/>
+              </a:ext>
+            </a:extLst>
+          </a:blip>
+          <a:stretch>
+            <a:fillRect/>
+          </a:stretch>
+        </p:blipFill>
+        <p:spPr>
+          <a:xfrm>
+            <a:off x="1066800" y="3170750"/>
+            <a:ext cx="3352800" cy="1552464"/>
+          </a:xfrm>
+          <a:prstGeom prst="rect">
+            <a:avLst/>
+          </a:prstGeom>
+        </p:spPr>
+      </p:pic>
+    </p:spTree>
+    <p:extLst>
+      <p:ext uri="{BB962C8B-B14F-4D97-AF65-F5344CB8AC3E}">
+        <p14:creationId xmlns:p14="http://schemas.microsoft.com/office/powerpoint/2010/main" val="1644055306"/>
+      </p:ext>
+    </p:extLst>
+  </p:cSld>
+  <p:clrMapOvr>
+    <a:masterClrMapping/>
+  </p:clrMapOvr>
+</p:sld>
+</file>
+
+<file path=ppt/slides/slide12.xml><?xml version="1.0" encoding="utf-8"?>
+<p:sld xmlns:a="http://schemas.openxmlformats.org/drawingml/2006/main" xmlns:r="http://schemas.openxmlformats.org/officeDocument/2006/relationships" xmlns:p="http://schemas.openxmlformats.org/presentationml/2006/main">
+  <p:cSld>
+    <p:spTree>
+      <p:nvGrpSpPr>
+        <p:cNvPr id="1" name=""/>
+        <p:cNvGrpSpPr/>
+        <p:nvPr/>
+      </p:nvGrpSpPr>
+      <p:grpSpPr>
+        <a:xfrm>
+          <a:off x="0" y="0"/>
+          <a:ext cx="0" cy="0"/>
+          <a:chOff x="0" y="0"/>
+          <a:chExt cx="0" cy="0"/>
+        </a:xfrm>
+      </p:grpSpPr>
+      <p:sp>
+        <p:nvSpPr>
+          <p:cNvPr id="2" name="Title 1"/>
+          <p:cNvSpPr>
+            <a:spLocks noGrp="1"/>
+          </p:cNvSpPr>
+          <p:nvPr>
+            <p:ph type="title"/>
+          </p:nvPr>
+        </p:nvSpPr>
+        <p:spPr/>
+        <p:txBody>
+          <a:bodyPr/>
+          <a:lstStyle/>
+          <a:p>
+            <a:r>
+              <a:rPr lang="en-US" dirty="0" smtClean="0"/>
+              <a:t>Khoảng trắng</a:t>
+            </a:r>
+            <a:endParaRPr lang="en-US" dirty="0"/>
+          </a:p>
+        </p:txBody>
+      </p:sp>
+      <p:sp>
+        <p:nvSpPr>
+          <p:cNvPr id="3" name="Content Placeholder 2"/>
+          <p:cNvSpPr>
+            <a:spLocks noGrp="1"/>
+          </p:cNvSpPr>
+          <p:nvPr>
+            <p:ph idx="1"/>
+          </p:nvPr>
+        </p:nvSpPr>
+        <p:spPr/>
+        <p:txBody>
+          <a:bodyPr>
+            <a:normAutofit/>
+          </a:bodyPr>
+          <a:lstStyle/>
+          <a:p>
+            <a:pPr lvl="1"/>
+            <a:r>
+              <a:rPr lang="en-US" sz="2000" dirty="0"/>
+              <a:t>Sử dụng khoảng trắng trong vồng lặp </a:t>
+            </a:r>
+            <a:r>
+              <a:rPr lang="en-US" sz="2000" dirty="0" smtClean="0"/>
+              <a:t>for</a:t>
+            </a:r>
+          </a:p>
+          <a:p>
+            <a:pPr marL="457200" lvl="1" indent="0">
+              <a:buNone/>
+            </a:pPr>
+            <a:r>
+              <a:rPr lang="en-US" sz="2000" dirty="0" smtClean="0"/>
+              <a:t>	Nên: for (int i = 0; i &lt; 10; i++ )</a:t>
+            </a:r>
+          </a:p>
+          <a:p>
+            <a:pPr marL="457200" lvl="1" indent="0">
+              <a:buNone/>
+            </a:pPr>
+            <a:r>
+              <a:rPr lang="en-US" sz="2000" dirty="0"/>
+              <a:t>	</a:t>
+            </a:r>
+            <a:r>
+              <a:rPr lang="en-US" sz="2000" dirty="0" smtClean="0"/>
+              <a:t>không nên: for(int i=0;i&lt;10;i++)</a:t>
+            </a:r>
+            <a:endParaRPr lang="en-US" sz="2000" dirty="0"/>
+          </a:p>
+          <a:p>
+            <a:pPr lvl="1"/>
+            <a:r>
+              <a:rPr lang="en-US" sz="2000" dirty="0"/>
+              <a:t>Sử dụng trong khai báo phương </a:t>
+            </a:r>
+            <a:r>
+              <a:rPr lang="en-US" sz="2000" dirty="0" smtClean="0"/>
+              <a:t>thức</a:t>
+            </a:r>
+          </a:p>
+          <a:p>
+            <a:pPr marL="457200" lvl="1" indent="0">
+              <a:buNone/>
+            </a:pPr>
+            <a:r>
+              <a:rPr lang="en-US" sz="2000" dirty="0" smtClean="0"/>
+              <a:t>	Nên</a:t>
+            </a:r>
+          </a:p>
+          <a:p>
+            <a:pPr marL="457200" lvl="1" indent="0">
+              <a:buNone/>
+            </a:pPr>
+            <a:endParaRPr lang="en-US" sz="2000" dirty="0"/>
+          </a:p>
+          <a:p>
+            <a:pPr marL="457200" lvl="1" indent="0">
+              <a:buNone/>
+            </a:pPr>
+            <a:endParaRPr lang="en-US" sz="2000" dirty="0" smtClean="0"/>
+          </a:p>
+          <a:p>
+            <a:pPr marL="457200" lvl="1" indent="0">
+              <a:buNone/>
+            </a:pPr>
+            <a:endParaRPr lang="en-US" sz="2000" dirty="0"/>
+          </a:p>
+          <a:p>
+            <a:pPr marL="457200" lvl="1" indent="0">
+              <a:buNone/>
+            </a:pPr>
+            <a:r>
+              <a:rPr lang="en-US" sz="2000" dirty="0" smtClean="0"/>
+              <a:t>	không nên:</a:t>
+            </a:r>
+          </a:p>
+          <a:p>
+            <a:pPr marL="457200" lvl="1" indent="0">
+              <a:buNone/>
+            </a:pPr>
+            <a:r>
+              <a:rPr lang="en-US" sz="2000" dirty="0"/>
+              <a:t>	</a:t>
+            </a:r>
+            <a:r>
+              <a:rPr lang="en-US" sz="2000" dirty="0" smtClean="0"/>
+              <a:t>myMethod(int a,int a[],int n) ;</a:t>
+            </a:r>
+            <a:endParaRPr lang="en-US" sz="2000" dirty="0"/>
+          </a:p>
+          <a:p>
+            <a:endParaRPr lang="en-US" sz="2000" dirty="0"/>
+          </a:p>
+        </p:txBody>
+      </p:sp>
+      <p:pic>
+        <p:nvPicPr>
+          <p:cNvPr id="4" name="Picture 3"/>
+          <p:cNvPicPr>
+            <a:picLocks noChangeAspect="1"/>
+          </p:cNvPicPr>
+          <p:nvPr/>
+        </p:nvPicPr>
+        <p:blipFill>
+          <a:blip r:embed="rId2">
+            <a:extLst>
+              <a:ext uri="{28A0092B-C50C-407E-A947-70E740481C1C}">
+                <a14:useLocalDpi xmlns:a14="http://schemas.microsoft.com/office/drawing/2010/main" val="0"/>
+              </a:ext>
+            </a:extLst>
+          </a:blip>
+          <a:stretch>
+            <a:fillRect/>
+          </a:stretch>
+        </p:blipFill>
+        <p:spPr>
+          <a:xfrm>
+            <a:off x="1447800" y="3657600"/>
+            <a:ext cx="4816933" cy="762000"/>
+          </a:xfrm>
+          <a:prstGeom prst="rect">
+            <a:avLst/>
+          </a:prstGeom>
+        </p:spPr>
+      </p:pic>
+    </p:spTree>
+    <p:extLst>
+      <p:ext uri="{BB962C8B-B14F-4D97-AF65-F5344CB8AC3E}">
+        <p14:creationId xmlns:p14="http://schemas.microsoft.com/office/powerpoint/2010/main" val="1437910749"/>
+      </p:ext>
+    </p:extLst>
+  </p:cSld>
+  <p:clrMapOvr>
+    <a:masterClrMapping/>
+  </p:clrMapOvr>
+</p:sld>
+</file>
+
+<file path=ppt/slides/slide13.xml><?xml version="1.0" encoding="utf-8"?>
+<p:sld xmlns:a="http://schemas.openxmlformats.org/drawingml/2006/main" xmlns:r="http://schemas.openxmlformats.org/officeDocument/2006/relationships" xmlns:p="http://schemas.openxmlformats.org/presentationml/2006/main">
+  <p:cSld>
+    <p:spTree>
+      <p:nvGrpSpPr>
+        <p:cNvPr id="1" name=""/>
+        <p:cNvGrpSpPr/>
+        <p:nvPr/>
+      </p:nvGrpSpPr>
+      <p:grpSpPr>
+        <a:xfrm>
+          <a:off x="0" y="0"/>
+          <a:ext cx="0" cy="0"/>
+          <a:chOff x="0" y="0"/>
+          <a:chExt cx="0" cy="0"/>
+        </a:xfrm>
+      </p:grpSpPr>
+      <p:sp>
+        <p:nvSpPr>
+          <p:cNvPr id="2" name="Title 1"/>
+          <p:cNvSpPr>
+            <a:spLocks noGrp="1"/>
+          </p:cNvSpPr>
+          <p:nvPr>
+            <p:ph type="title"/>
+          </p:nvPr>
+        </p:nvSpPr>
+        <p:spPr/>
+        <p:txBody>
+          <a:bodyPr/>
+          <a:lstStyle/>
+          <a:p>
+            <a:r>
+              <a:rPr lang="en-US" dirty="0" smtClean="0"/>
+              <a:t>Một số kinh nghiệm khác</a:t>
+            </a:r>
+            <a:endParaRPr lang="en-US" dirty="0"/>
+          </a:p>
+        </p:txBody>
+      </p:sp>
+      <p:sp>
+        <p:nvSpPr>
+          <p:cNvPr id="3" name="Content Placeholder 2"/>
+          <p:cNvSpPr>
+            <a:spLocks noGrp="1"/>
+          </p:cNvSpPr>
+          <p:nvPr>
+            <p:ph idx="1"/>
+          </p:nvPr>
+        </p:nvSpPr>
+        <p:spPr/>
+        <p:txBody>
+          <a:bodyPr>
+            <a:normAutofit/>
+          </a:bodyPr>
+          <a:lstStyle/>
+          <a:p>
+            <a:r>
+              <a:rPr lang="en-US" sz="1800" dirty="0" smtClean="0"/>
+              <a:t>Khi thực hiện trả về giá trị :</a:t>
+            </a:r>
+          </a:p>
+          <a:p>
+            <a:r>
+              <a:rPr lang="en-US" sz="1800" dirty="0" smtClean="0"/>
+              <a:t>Trường hợp 1:</a:t>
+            </a:r>
+            <a:endParaRPr lang="en-US" sz="1400" dirty="0" smtClean="0"/>
+          </a:p>
+          <a:p>
+            <a:endParaRPr lang="en-US" sz="1800" dirty="0"/>
+          </a:p>
+          <a:p>
+            <a:endParaRPr lang="en-US" sz="1800" dirty="0" smtClean="0"/>
+          </a:p>
+          <a:p>
+            <a:endParaRPr lang="en-US" sz="1800" dirty="0"/>
+          </a:p>
+          <a:p>
+            <a:pPr marL="0" indent="0">
+              <a:buNone/>
+            </a:pPr>
+            <a:endParaRPr lang="en-US" sz="1800" dirty="0"/>
+          </a:p>
+          <a:p>
+            <a:pPr marL="0" indent="0">
+              <a:buNone/>
+            </a:pPr>
+            <a:endParaRPr lang="en-US" sz="1800" dirty="0" smtClean="0"/>
+          </a:p>
+          <a:p>
+            <a:r>
+              <a:rPr lang="en-US" sz="1800" dirty="0" smtClean="0"/>
+              <a:t>Nên sử dụng : </a:t>
+            </a:r>
+          </a:p>
+          <a:p>
+            <a:pPr marL="0" indent="0">
+              <a:buNone/>
+            </a:pPr>
+            <a:r>
+              <a:rPr lang="en-US" sz="1800" dirty="0"/>
+              <a:t>	 return booleanExpression ;</a:t>
+            </a:r>
+          </a:p>
+          <a:p>
+            <a:pPr marL="0" indent="0">
+              <a:buNone/>
+            </a:pPr>
+            <a:endParaRPr lang="en-US" sz="1800" dirty="0" smtClean="0"/>
+          </a:p>
+          <a:p>
+            <a:endParaRPr lang="en-US" sz="1800" dirty="0"/>
+          </a:p>
+        </p:txBody>
+      </p:sp>
+      <p:pic>
+        <p:nvPicPr>
+          <p:cNvPr id="4" name="Picture 3"/>
+          <p:cNvPicPr>
+            <a:picLocks noChangeAspect="1"/>
+          </p:cNvPicPr>
+          <p:nvPr/>
+        </p:nvPicPr>
+        <p:blipFill>
+          <a:blip r:embed="rId2">
+            <a:extLst>
+              <a:ext uri="{28A0092B-C50C-407E-A947-70E740481C1C}">
+                <a14:useLocalDpi xmlns:a14="http://schemas.microsoft.com/office/drawing/2010/main" val="0"/>
+              </a:ext>
+            </a:extLst>
+          </a:blip>
+          <a:stretch>
+            <a:fillRect/>
+          </a:stretch>
+        </p:blipFill>
+        <p:spPr>
+          <a:xfrm>
+            <a:off x="914400" y="2286000"/>
+            <a:ext cx="2957471" cy="1447800"/>
+          </a:xfrm>
+          <a:prstGeom prst="rect">
+            <a:avLst/>
+          </a:prstGeom>
+        </p:spPr>
+      </p:pic>
+    </p:spTree>
+    <p:extLst>
+      <p:ext uri="{BB962C8B-B14F-4D97-AF65-F5344CB8AC3E}">
+        <p14:creationId xmlns:p14="http://schemas.microsoft.com/office/powerpoint/2010/main" val="1436176636"/>
+      </p:ext>
+    </p:extLst>
+  </p:cSld>
+  <p:clrMapOvr>
+    <a:masterClrMapping/>
+  </p:clrMapOvr>
+</p:sld>
+</file>
+
+<file path=ppt/slides/slide14.xml><?xml version="1.0" encoding="utf-8"?>
+<p:sld xmlns:a="http://schemas.openxmlformats.org/drawingml/2006/main" xmlns:r="http://schemas.openxmlformats.org/officeDocument/2006/relationships" xmlns:p="http://schemas.openxmlformats.org/presentationml/2006/main">
+  <p:cSld>
+    <p:spTree>
+      <p:nvGrpSpPr>
+        <p:cNvPr id="1" name=""/>
+        <p:cNvGrpSpPr/>
+        <p:nvPr/>
+      </p:nvGrpSpPr>
+      <p:grpSpPr>
+        <a:xfrm>
+          <a:off x="0" y="0"/>
+          <a:ext cx="0" cy="0"/>
+          <a:chOff x="0" y="0"/>
+          <a:chExt cx="0" cy="0"/>
+        </a:xfrm>
+      </p:grpSpPr>
+      <p:sp>
+        <p:nvSpPr>
+          <p:cNvPr id="2" name="Title 1"/>
+          <p:cNvSpPr>
+            <a:spLocks noGrp="1"/>
+          </p:cNvSpPr>
+          <p:nvPr>
+            <p:ph type="title"/>
+          </p:nvPr>
+        </p:nvSpPr>
+        <p:spPr/>
+        <p:txBody>
+          <a:bodyPr/>
+          <a:lstStyle/>
+          <a:p>
+            <a:r>
+              <a:rPr lang="en-US" dirty="0"/>
+              <a:t>Một số kinh nghiệm khác</a:t>
+            </a:r>
+          </a:p>
+        </p:txBody>
+      </p:sp>
+      <p:sp>
+        <p:nvSpPr>
+          <p:cNvPr id="3" name="Content Placeholder 2"/>
+          <p:cNvSpPr>
+            <a:spLocks noGrp="1"/>
+          </p:cNvSpPr>
+          <p:nvPr>
+            <p:ph idx="1"/>
+          </p:nvPr>
+        </p:nvSpPr>
+        <p:spPr/>
+        <p:txBody>
+          <a:bodyPr>
+            <a:normAutofit/>
+          </a:bodyPr>
+          <a:lstStyle/>
+          <a:p>
+            <a:r>
+              <a:rPr lang="en-US" sz="1800" dirty="0" smtClean="0"/>
+              <a:t>Trường hợp 2:</a:t>
+            </a:r>
+          </a:p>
+          <a:p>
+            <a:endParaRPr lang="en-US" sz="1800" dirty="0"/>
+          </a:p>
+          <a:p>
+            <a:endParaRPr lang="en-US" sz="1800" dirty="0" smtClean="0"/>
+          </a:p>
+          <a:p>
+            <a:endParaRPr lang="en-US" sz="1800" dirty="0"/>
+          </a:p>
+          <a:p>
+            <a:endParaRPr lang="en-US" sz="1800" dirty="0" smtClean="0"/>
+          </a:p>
+          <a:p>
+            <a:endParaRPr lang="en-US" sz="1800" dirty="0"/>
+          </a:p>
+          <a:p>
+            <a:r>
+              <a:rPr lang="en-US" sz="1800" dirty="0" smtClean="0"/>
+              <a:t>Nên sử dụng :</a:t>
+            </a:r>
+          </a:p>
+          <a:p>
+            <a:pPr marL="0" indent="0">
+              <a:buNone/>
+            </a:pPr>
+            <a:r>
+              <a:rPr lang="en-US" sz="1800" dirty="0"/>
+              <a:t>	</a:t>
+            </a:r>
+            <a:r>
+              <a:rPr lang="en-US" sz="1800" dirty="0" smtClean="0"/>
+              <a:t>return (condition ? X : y) ;</a:t>
+            </a:r>
+          </a:p>
+          <a:p>
+            <a:endParaRPr lang="en-US" sz="1800" dirty="0" smtClean="0"/>
+          </a:p>
+          <a:p>
+            <a:endParaRPr lang="en-US" sz="1800" dirty="0"/>
+          </a:p>
+        </p:txBody>
+      </p:sp>
+      <p:pic>
+        <p:nvPicPr>
+          <p:cNvPr id="4" name="Picture 3"/>
+          <p:cNvPicPr>
+            <a:picLocks noChangeAspect="1"/>
+          </p:cNvPicPr>
+          <p:nvPr/>
+        </p:nvPicPr>
+        <p:blipFill>
+          <a:blip r:embed="rId2">
+            <a:extLst>
+              <a:ext uri="{28A0092B-C50C-407E-A947-70E740481C1C}">
+                <a14:useLocalDpi xmlns:a14="http://schemas.microsoft.com/office/drawing/2010/main" val="0"/>
+              </a:ext>
+            </a:extLst>
+          </a:blip>
+          <a:stretch>
+            <a:fillRect/>
+          </a:stretch>
+        </p:blipFill>
+        <p:spPr>
+          <a:xfrm>
+            <a:off x="1066799" y="2133600"/>
+            <a:ext cx="3189355" cy="1447800"/>
+          </a:xfrm>
+          <a:prstGeom prst="rect">
+            <a:avLst/>
+          </a:prstGeom>
+        </p:spPr>
+      </p:pic>
+    </p:spTree>
+    <p:extLst>
+      <p:ext uri="{BB962C8B-B14F-4D97-AF65-F5344CB8AC3E}">
+        <p14:creationId xmlns:p14="http://schemas.microsoft.com/office/powerpoint/2010/main" val="3858467775"/>
+      </p:ext>
+    </p:extLst>
+  </p:cSld>
+  <p:clrMapOvr>
+    <a:masterClrMapping/>
+  </p:clrMapOvr>
+</p:sld>
+</file>
+
+<file path=ppt/slides/slide15.xml><?xml version="1.0" encoding="utf-8"?>
+<p:sld xmlns:a="http://schemas.openxmlformats.org/drawingml/2006/main" xmlns:r="http://schemas.openxmlformats.org/officeDocument/2006/relationships" xmlns:p="http://schemas.openxmlformats.org/presentationml/2006/main">
+  <p:cSld>
+    <p:spTree>
+      <p:nvGrpSpPr>
+        <p:cNvPr id="1" name=""/>
+        <p:cNvGrpSpPr/>
+        <p:nvPr/>
+      </p:nvGrpSpPr>
+      <p:grpSpPr>
+        <a:xfrm>
+          <a:off x="0" y="0"/>
+          <a:ext cx="0" cy="0"/>
+          <a:chOff x="0" y="0"/>
+          <a:chExt cx="0" cy="0"/>
+        </a:xfrm>
+      </p:grpSpPr>
+      <p:sp>
+        <p:nvSpPr>
+          <p:cNvPr id="2" name="Title 1"/>
+          <p:cNvSpPr>
+            <a:spLocks noGrp="1"/>
+          </p:cNvSpPr>
+          <p:nvPr>
+            <p:ph type="title"/>
+          </p:nvPr>
+        </p:nvSpPr>
+        <p:spPr/>
+        <p:txBody>
+          <a:bodyPr/>
+          <a:lstStyle/>
+          <a:p>
+            <a:r>
+              <a:rPr lang="en-US" dirty="0"/>
+              <a:t>Một số kinh nghiệm khác</a:t>
+            </a:r>
+            <a:r>
+              <a:rPr lang="en-US" dirty="0" smtClean="0"/>
+              <a:t>số </a:t>
+            </a:r>
+            <a:endParaRPr lang="en-US" dirty="0"/>
+          </a:p>
+        </p:txBody>
+      </p:sp>
+      <p:sp>
+        <p:nvSpPr>
+          <p:cNvPr id="3" name="Content Placeholder 2"/>
+          <p:cNvSpPr>
+            <a:spLocks noGrp="1"/>
+          </p:cNvSpPr>
+          <p:nvPr>
+            <p:ph idx="1"/>
+          </p:nvPr>
+        </p:nvSpPr>
+        <p:spPr/>
+        <p:txBody>
+          <a:bodyPr>
+            <a:normAutofit/>
+          </a:bodyPr>
+          <a:lstStyle/>
+          <a:p>
+            <a:r>
+              <a:rPr lang="en-US" sz="1800" dirty="0" smtClean="0"/>
+              <a:t>Sử dụng dấu ‘()’ để phân biệt các phép tính rõ ràng </a:t>
+            </a:r>
+          </a:p>
+          <a:p>
+            <a:r>
+              <a:rPr lang="en-US" sz="1800" dirty="0" smtClean="0"/>
+              <a:t>Nên: </a:t>
+            </a:r>
+          </a:p>
+          <a:p>
+            <a:pPr lvl="1"/>
+            <a:r>
+              <a:rPr lang="en-US" sz="1800" dirty="0"/>
+              <a:t>if ((a == b) || (c == d))</a:t>
+            </a:r>
+          </a:p>
+          <a:p>
+            <a:pPr lvl="1"/>
+            <a:r>
+              <a:rPr lang="en-US" sz="1800" dirty="0"/>
+              <a:t>a = a + (x*b) + (x*x*c) +d ;</a:t>
+            </a:r>
+          </a:p>
+          <a:p>
+            <a:pPr lvl="1"/>
+            <a:r>
+              <a:rPr lang="en-US" sz="1800" dirty="0"/>
+              <a:t>(x &gt;= 0) ? x : -x ;</a:t>
+            </a:r>
+          </a:p>
+          <a:p>
+            <a:pPr marL="0" indent="0">
+              <a:buNone/>
+            </a:pPr>
+            <a:endParaRPr lang="en-US" sz="1800" dirty="0" smtClean="0"/>
+          </a:p>
+          <a:p>
+            <a:r>
+              <a:rPr lang="en-US" sz="1800" dirty="0" smtClean="0"/>
+              <a:t>Không nên: </a:t>
+            </a:r>
+          </a:p>
+          <a:p>
+            <a:pPr lvl="1"/>
+            <a:r>
+              <a:rPr lang="en-US" sz="1800" dirty="0" smtClean="0"/>
+              <a:t>if (a == b || c == d)</a:t>
+            </a:r>
+          </a:p>
+          <a:p>
+            <a:pPr lvl="1"/>
+            <a:r>
+              <a:rPr lang="en-US" sz="1800" dirty="0" smtClean="0"/>
+              <a:t>a = a + x*b + x*x*c +d ;</a:t>
+            </a:r>
+          </a:p>
+          <a:p>
+            <a:pPr lvl="1"/>
+            <a:r>
+              <a:rPr lang="en-US" sz="1800" dirty="0" smtClean="0"/>
+              <a:t>x &gt;= 0 ? x : -x ;</a:t>
+            </a:r>
+          </a:p>
+        </p:txBody>
+      </p:sp>
+    </p:spTree>
+    <p:extLst>
+      <p:ext uri="{BB962C8B-B14F-4D97-AF65-F5344CB8AC3E}">
+        <p14:creationId xmlns:p14="http://schemas.microsoft.com/office/powerpoint/2010/main" val="2942387424"/>
+      </p:ext>
+    </p:extLst>
+  </p:cSld>
+  <p:clrMapOvr>
+    <a:masterClrMapping/>
+  </p:clrMapOvr>
+</p:sld>
+</file>
+
+<file path=ppt/slides/slide16.xml><?xml version="1.0" encoding="utf-8"?>
+<p:sld xmlns:a="http://schemas.openxmlformats.org/drawingml/2006/main" xmlns:r="http://schemas.openxmlformats.org/officeDocument/2006/relationships" xmlns:p="http://schemas.openxmlformats.org/presentationml/2006/main">
+  <p:cSld>
+    <p:spTree>
+      <p:nvGrpSpPr>
+        <p:cNvPr id="1" name=""/>
+        <p:cNvGrpSpPr/>
+        <p:nvPr/>
+      </p:nvGrpSpPr>
+      <p:grpSpPr>
+        <a:xfrm>
+          <a:off x="0" y="0"/>
+          <a:ext cx="0" cy="0"/>
+          <a:chOff x="0" y="0"/>
+          <a:chExt cx="0" cy="0"/>
+        </a:xfrm>
+      </p:grpSpPr>
+      <p:sp>
+        <p:nvSpPr>
+          <p:cNvPr id="2" name="Title 1"/>
+          <p:cNvSpPr>
+            <a:spLocks noGrp="1"/>
+          </p:cNvSpPr>
+          <p:nvPr>
+            <p:ph type="title"/>
+          </p:nvPr>
+        </p:nvSpPr>
+        <p:spPr/>
+        <p:txBody>
+          <a:bodyPr/>
+          <a:lstStyle/>
+          <a:p>
+            <a:r>
+              <a:rPr lang="en-US" dirty="0" smtClean="0"/>
+              <a:t>Nguồn Tham Khảo</a:t>
+            </a:r>
+            <a:endParaRPr lang="en-US" dirty="0"/>
+          </a:p>
+        </p:txBody>
+      </p:sp>
+      <p:sp>
+        <p:nvSpPr>
+          <p:cNvPr id="3" name="Content Placeholder 2"/>
+          <p:cNvSpPr>
+            <a:spLocks noGrp="1"/>
+          </p:cNvSpPr>
+          <p:nvPr>
+            <p:ph idx="1"/>
+          </p:nvPr>
+        </p:nvSpPr>
+        <p:spPr/>
+        <p:txBody>
+          <a:bodyPr/>
+          <a:lstStyle/>
+          <a:p>
+            <a:r>
+              <a:rPr lang="en-US" dirty="0">
+                <a:hlinkClick r:id="rId2"/>
+              </a:rPr>
+              <a:t>http://</a:t>
+            </a:r>
+            <a:r>
+              <a:rPr lang="en-US" dirty="0" smtClean="0">
+                <a:hlinkClick r:id="rId2"/>
+              </a:rPr>
+              <a:t>www.oracle.com/technetwork/java/javase/documentation/codeconvtoc-136057.html</a:t>
+            </a:r>
+            <a:endParaRPr lang="en-US" dirty="0" smtClean="0"/>
+          </a:p>
+          <a:p>
+            <a:endParaRPr lang="en-US" dirty="0"/>
+          </a:p>
+        </p:txBody>
+      </p:sp>
+    </p:spTree>
+    <p:extLst>
+      <p:ext uri="{BB962C8B-B14F-4D97-AF65-F5344CB8AC3E}">
+        <p14:creationId xmlns:p14="http://schemas.microsoft.com/office/powerpoint/2010/main" val="961866178"/>
+      </p:ext>
+    </p:extLst>
+  </p:cSld>
+  <p:clrMapOvr>
+    <a:masterClrMapping/>
+  </p:clrMapOvr>
+</p:sld>
+</file>
+
 <file path=ppt/slides/slide2.xml><?xml version="1.0" encoding="utf-8"?>
+<p:sld xmlns:a="http://schemas.openxmlformats.org/drawingml/2006/main" xmlns:r="http://schemas.openxmlformats.org/officeDocument/2006/relationships" xmlns:p="http://schemas.openxmlformats.org/presentationml/2006/main">
+  <p:cSld>
+    <p:spTree>
+      <p:nvGrpSpPr>
+        <p:cNvPr id="1" name=""/>
+        <p:cNvGrpSpPr/>
+        <p:nvPr/>
+      </p:nvGrpSpPr>
+      <p:grpSpPr>
+        <a:xfrm>
+          <a:off x="0" y="0"/>
+          <a:ext cx="0" cy="0"/>
+          <a:chOff x="0" y="0"/>
+          <a:chExt cx="0" cy="0"/>
+        </a:xfrm>
+      </p:grpSpPr>
+      <p:sp>
+        <p:nvSpPr>
+          <p:cNvPr id="2" name="Title 1"/>
+          <p:cNvSpPr>
+            <a:spLocks noGrp="1"/>
+          </p:cNvSpPr>
+          <p:nvPr>
+            <p:ph type="title"/>
+          </p:nvPr>
+        </p:nvSpPr>
+        <p:spPr/>
+        <p:txBody>
+          <a:bodyPr/>
+          <a:lstStyle/>
+          <a:p>
+            <a:r>
+              <a:rPr lang="en-US" dirty="0" smtClean="0"/>
+              <a:t>Nội Dung</a:t>
+            </a:r>
+            <a:endParaRPr lang="en-US" dirty="0"/>
+          </a:p>
+        </p:txBody>
+      </p:sp>
+      <p:sp>
+        <p:nvSpPr>
+          <p:cNvPr id="3" name="Content Placeholder 2"/>
+          <p:cNvSpPr>
+            <a:spLocks noGrp="1"/>
+          </p:cNvSpPr>
+          <p:nvPr>
+            <p:ph idx="1"/>
+          </p:nvPr>
+        </p:nvSpPr>
+        <p:spPr/>
+        <p:txBody>
+          <a:bodyPr/>
+          <a:lstStyle/>
+          <a:p>
+            <a:r>
+              <a:rPr lang="en-US" dirty="0" smtClean="0"/>
+              <a:t>Khai báo</a:t>
+            </a:r>
+          </a:p>
+          <a:p>
+            <a:r>
+              <a:rPr lang="en-US" dirty="0" smtClean="0"/>
+              <a:t>Dòng Lệnh</a:t>
+            </a:r>
+          </a:p>
+          <a:p>
+            <a:r>
+              <a:rPr lang="en-US" dirty="0" smtClean="0"/>
+              <a:t>Khoảng trắng</a:t>
+            </a:r>
+          </a:p>
+          <a:p>
+            <a:r>
+              <a:rPr lang="en-US" smtClean="0"/>
+              <a:t>Một số kinh nghiệm</a:t>
+            </a:r>
+            <a:endParaRPr lang="en-US" dirty="0" smtClean="0"/>
+          </a:p>
+          <a:p>
+            <a:endParaRPr lang="en-US" dirty="0" smtClean="0"/>
+          </a:p>
+          <a:p>
+            <a:endParaRPr lang="en-US" dirty="0"/>
+          </a:p>
+        </p:txBody>
+      </p:sp>
+    </p:spTree>
+    <p:extLst>
+      <p:ext uri="{BB962C8B-B14F-4D97-AF65-F5344CB8AC3E}">
+        <p14:creationId xmlns:p14="http://schemas.microsoft.com/office/powerpoint/2010/main" val="1464510354"/>
+      </p:ext>
+    </p:extLst>
+  </p:cSld>
+  <p:clrMapOvr>
+    <a:masterClrMapping/>
+  </p:clrMapOvr>
+</p:sld>
+</file>
+
+<file path=ppt/slides/slide3.xml><?xml version="1.0" encoding="utf-8"?>
 <p:sld xmlns:a="http://schemas.openxmlformats.org/drawingml/2006/main" xmlns:r="http://schemas.openxmlformats.org/officeDocument/2006/relationships" xmlns:p="http://schemas.openxmlformats.org/presentationml/2006/main">
   <p:cSld>
     <p:spTree>
@@ -3422,7 +4645,7 @@
 </p:sld>
 </file>
 
-<file path=ppt/slides/slide3.xml><?xml version="1.0" encoding="utf-8"?>
+<file path=ppt/slides/slide4.xml><?xml version="1.0" encoding="utf-8"?>
 <p:sld xmlns:a="http://schemas.openxmlformats.org/drawingml/2006/main" xmlns:r="http://schemas.openxmlformats.org/officeDocument/2006/relationships" xmlns:p="http://schemas.openxmlformats.org/presentationml/2006/main">
   <p:cSld>
     <p:spTree>
@@ -3625,182 +4848,6 @@
 </p:sld>
 </file>
 
-<file path=ppt/slides/slide4.xml><?xml version="1.0" encoding="utf-8"?>
-<p:sld xmlns:a="http://schemas.openxmlformats.org/drawingml/2006/main" xmlns:r="http://schemas.openxmlformats.org/officeDocument/2006/relationships" xmlns:p="http://schemas.openxmlformats.org/presentationml/2006/main">
-  <p:cSld>
-    <p:spTree>
-      <p:nvGrpSpPr>
-        <p:cNvPr id="1" name=""/>
-        <p:cNvGrpSpPr/>
-        <p:nvPr/>
-      </p:nvGrpSpPr>
-      <p:grpSpPr>
-        <a:xfrm>
-          <a:off x="0" y="0"/>
-          <a:ext cx="0" cy="0"/>
-          <a:chOff x="0" y="0"/>
-          <a:chExt cx="0" cy="0"/>
-        </a:xfrm>
-      </p:grpSpPr>
-      <p:sp>
-        <p:nvSpPr>
-          <p:cNvPr id="2" name="Title 1"/>
-          <p:cNvSpPr>
-            <a:spLocks noGrp="1"/>
-          </p:cNvSpPr>
-          <p:nvPr>
-            <p:ph type="title"/>
-          </p:nvPr>
-        </p:nvSpPr>
-        <p:spPr/>
-        <p:txBody>
-          <a:bodyPr/>
-          <a:lstStyle/>
-          <a:p>
-            <a:r>
-              <a:rPr lang="en-US" dirty="0" smtClean="0"/>
-              <a:t>Statement</a:t>
-            </a:r>
-            <a:endParaRPr lang="en-US" dirty="0"/>
-          </a:p>
-        </p:txBody>
-      </p:sp>
-      <p:sp>
-        <p:nvSpPr>
-          <p:cNvPr id="3" name="Content Placeholder 2"/>
-          <p:cNvSpPr>
-            <a:spLocks noGrp="1"/>
-          </p:cNvSpPr>
-          <p:nvPr>
-            <p:ph idx="1"/>
-          </p:nvPr>
-        </p:nvSpPr>
-        <p:spPr/>
-        <p:txBody>
-          <a:bodyPr>
-            <a:normAutofit/>
-          </a:bodyPr>
-          <a:lstStyle/>
-          <a:p>
-            <a:r>
-              <a:rPr lang="en-US" sz="1800" dirty="0" smtClean="0"/>
-              <a:t>Mỗi dòng chỉ nên chứa một dòng lệnh</a:t>
-            </a:r>
-          </a:p>
-          <a:p>
-            <a:pPr lvl="1"/>
-            <a:r>
-              <a:rPr lang="en-US" sz="1800" dirty="0"/>
-              <a:t>Nên:</a:t>
-            </a:r>
-          </a:p>
-          <a:p>
-            <a:pPr lvl="2"/>
-            <a:r>
-              <a:rPr lang="en-US" sz="1800" dirty="0"/>
-              <a:t>int x = 0 ;</a:t>
-            </a:r>
-          </a:p>
-          <a:p>
-            <a:pPr lvl="2"/>
-            <a:r>
-              <a:rPr lang="en-US" sz="1800" dirty="0"/>
-              <a:t>i++ ;</a:t>
-            </a:r>
-          </a:p>
-          <a:p>
-            <a:pPr lvl="1"/>
-            <a:r>
-              <a:rPr lang="en-US" sz="1800" dirty="0"/>
-              <a:t>Không nên:</a:t>
-            </a:r>
-          </a:p>
-          <a:p>
-            <a:pPr lvl="2"/>
-            <a:r>
-              <a:rPr lang="en-US" sz="1800" dirty="0"/>
-              <a:t>Int x = 0 ; i++ </a:t>
-            </a:r>
-            <a:r>
-              <a:rPr lang="en-US" sz="1800" dirty="0" smtClean="0"/>
-              <a:t>;</a:t>
-            </a:r>
-          </a:p>
-          <a:p>
-            <a:r>
-              <a:rPr lang="en-US" sz="1800" dirty="0" smtClean="0"/>
-              <a:t>Đối với dòng lệnh return không nên sử dụng dấu ‘()’, trừ khi câu lệnh thực hiện xử lý để trả về kết quả.</a:t>
-            </a:r>
-          </a:p>
-          <a:p>
-            <a:pPr lvl="1"/>
-            <a:r>
-              <a:rPr lang="en-US" sz="1400" dirty="0" smtClean="0"/>
-              <a:t>Nên:</a:t>
-            </a:r>
-          </a:p>
-          <a:p>
-            <a:pPr lvl="2"/>
-            <a:r>
-              <a:rPr lang="en-US" sz="1400" dirty="0" smtClean="0"/>
-              <a:t>Return x ;	</a:t>
-            </a:r>
-          </a:p>
-          <a:p>
-            <a:pPr lvl="2"/>
-            <a:r>
-              <a:rPr lang="en-US" sz="1400" dirty="0" smtClean="0"/>
-              <a:t>Return (size ? Size : defaultSize) ;</a:t>
-            </a:r>
-          </a:p>
-          <a:p>
-            <a:pPr lvl="1"/>
-            <a:r>
-              <a:rPr lang="en-US" sz="1400" dirty="0" smtClean="0"/>
-              <a:t>Không nên:</a:t>
-            </a:r>
-          </a:p>
-          <a:p>
-            <a:pPr lvl="2"/>
-            <a:r>
-              <a:rPr lang="en-US" sz="1400" dirty="0" smtClean="0"/>
-              <a:t>Return (x) ;</a:t>
-            </a:r>
-          </a:p>
-          <a:p>
-            <a:pPr marL="0" indent="0">
-              <a:buNone/>
-            </a:pPr>
-            <a:endParaRPr lang="en-US" sz="1800" dirty="0" smtClean="0"/>
-          </a:p>
-          <a:p>
-            <a:endParaRPr lang="en-US" sz="1800" dirty="0" smtClean="0"/>
-          </a:p>
-          <a:p>
-            <a:pPr marL="914400" lvl="2" indent="0">
-              <a:buNone/>
-            </a:pPr>
-            <a:endParaRPr lang="en-US" sz="1800" dirty="0" smtClean="0"/>
-          </a:p>
-          <a:p>
-            <a:pPr lvl="2"/>
-            <a:endParaRPr lang="en-US" sz="1800" dirty="0" smtClean="0"/>
-          </a:p>
-        </p:txBody>
-      </p:sp>
-    </p:spTree>
-    <p:extLst>
-      <p:ext uri="{BB962C8B-B14F-4D97-AF65-F5344CB8AC3E}">
-        <p14:creationId xmlns:p14="http://schemas.microsoft.com/office/powerpoint/2010/main" val="2288240511"/>
-      </p:ext>
-    </p:extLst>
-  </p:cSld>
-  <p:clrMapOvr>
-    <a:masterClrMapping/>
-  </p:clrMapOvr>
-</p:sld>
-</file>
-
 <file path=ppt/slides/slide5.xml><?xml version="1.0" encoding="utf-8"?>
 <p:sld xmlns:a="http://schemas.openxmlformats.org/drawingml/2006/main" xmlns:r="http://schemas.openxmlformats.org/officeDocument/2006/relationships" xmlns:p="http://schemas.openxmlformats.org/presentationml/2006/main">
   <p:cSld>
@@ -3835,7 +4882,7 @@
           <a:p>
             <a:r>
               <a:rPr lang="en-US" dirty="0" smtClean="0"/>
-              <a:t>Statement</a:t>
+              <a:t>Dòng Lệnh</a:t>
             </a:r>
             <a:endParaRPr lang="en-US" dirty="0"/>
           </a:p>
@@ -3860,6 +4907,182 @@
           <a:p>
             <a:r>
               <a:rPr lang="en-US" sz="1800" dirty="0" smtClean="0"/>
+              <a:t>Mỗi dòng chỉ nên chứa một dòng lệnh</a:t>
+            </a:r>
+          </a:p>
+          <a:p>
+            <a:pPr lvl="1"/>
+            <a:r>
+              <a:rPr lang="en-US" sz="1800" dirty="0"/>
+              <a:t>Nên:</a:t>
+            </a:r>
+          </a:p>
+          <a:p>
+            <a:pPr lvl="2"/>
+            <a:r>
+              <a:rPr lang="en-US" sz="1800" dirty="0"/>
+              <a:t>int x = 0 ;</a:t>
+            </a:r>
+          </a:p>
+          <a:p>
+            <a:pPr lvl="2"/>
+            <a:r>
+              <a:rPr lang="en-US" sz="1800" dirty="0"/>
+              <a:t>i++ ;</a:t>
+            </a:r>
+          </a:p>
+          <a:p>
+            <a:pPr lvl="1"/>
+            <a:r>
+              <a:rPr lang="en-US" sz="1800" dirty="0"/>
+              <a:t>Không nên:</a:t>
+            </a:r>
+          </a:p>
+          <a:p>
+            <a:pPr lvl="2"/>
+            <a:r>
+              <a:rPr lang="en-US" sz="1800" dirty="0"/>
+              <a:t>Int x = 0 ; i++ </a:t>
+            </a:r>
+            <a:r>
+              <a:rPr lang="en-US" sz="1800" dirty="0" smtClean="0"/>
+              <a:t>;</a:t>
+            </a:r>
+          </a:p>
+          <a:p>
+            <a:r>
+              <a:rPr lang="en-US" sz="1800" dirty="0" smtClean="0"/>
+              <a:t>Đối với dòng lệnh return không nên sử dụng dấu ‘()’, trừ khi câu lệnh thực hiện xử lý để trả về kết quả.</a:t>
+            </a:r>
+          </a:p>
+          <a:p>
+            <a:pPr lvl="1"/>
+            <a:r>
+              <a:rPr lang="en-US" sz="1400" dirty="0" smtClean="0"/>
+              <a:t>Nên:</a:t>
+            </a:r>
+          </a:p>
+          <a:p>
+            <a:pPr lvl="2"/>
+            <a:r>
+              <a:rPr lang="en-US" sz="1400" dirty="0" smtClean="0"/>
+              <a:t>Return x ;	</a:t>
+            </a:r>
+          </a:p>
+          <a:p>
+            <a:pPr lvl="2"/>
+            <a:r>
+              <a:rPr lang="en-US" sz="1400" dirty="0" smtClean="0"/>
+              <a:t>Return (size ? Size : defaultSize) ;</a:t>
+            </a:r>
+          </a:p>
+          <a:p>
+            <a:pPr lvl="1"/>
+            <a:r>
+              <a:rPr lang="en-US" sz="1400" dirty="0" smtClean="0"/>
+              <a:t>Không nên:</a:t>
+            </a:r>
+          </a:p>
+          <a:p>
+            <a:pPr lvl="2"/>
+            <a:r>
+              <a:rPr lang="en-US" sz="1400" dirty="0" smtClean="0"/>
+              <a:t>Return (x) ;</a:t>
+            </a:r>
+          </a:p>
+          <a:p>
+            <a:pPr marL="0" indent="0">
+              <a:buNone/>
+            </a:pPr>
+            <a:endParaRPr lang="en-US" sz="1800" dirty="0" smtClean="0"/>
+          </a:p>
+          <a:p>
+            <a:endParaRPr lang="en-US" sz="1800" dirty="0" smtClean="0"/>
+          </a:p>
+          <a:p>
+            <a:pPr marL="914400" lvl="2" indent="0">
+              <a:buNone/>
+            </a:pPr>
+            <a:endParaRPr lang="en-US" sz="1800" dirty="0" smtClean="0"/>
+          </a:p>
+          <a:p>
+            <a:pPr lvl="2"/>
+            <a:endParaRPr lang="en-US" sz="1800" dirty="0" smtClean="0"/>
+          </a:p>
+        </p:txBody>
+      </p:sp>
+    </p:spTree>
+    <p:extLst>
+      <p:ext uri="{BB962C8B-B14F-4D97-AF65-F5344CB8AC3E}">
+        <p14:creationId xmlns:p14="http://schemas.microsoft.com/office/powerpoint/2010/main" val="2288240511"/>
+      </p:ext>
+    </p:extLst>
+  </p:cSld>
+  <p:clrMapOvr>
+    <a:masterClrMapping/>
+  </p:clrMapOvr>
+</p:sld>
+</file>
+
+<file path=ppt/slides/slide6.xml><?xml version="1.0" encoding="utf-8"?>
+<p:sld xmlns:a="http://schemas.openxmlformats.org/drawingml/2006/main" xmlns:r="http://schemas.openxmlformats.org/officeDocument/2006/relationships" xmlns:p="http://schemas.openxmlformats.org/presentationml/2006/main">
+  <p:cSld>
+    <p:spTree>
+      <p:nvGrpSpPr>
+        <p:cNvPr id="1" name=""/>
+        <p:cNvGrpSpPr/>
+        <p:nvPr/>
+      </p:nvGrpSpPr>
+      <p:grpSpPr>
+        <a:xfrm>
+          <a:off x="0" y="0"/>
+          <a:ext cx="0" cy="0"/>
+          <a:chOff x="0" y="0"/>
+          <a:chExt cx="0" cy="0"/>
+        </a:xfrm>
+      </p:grpSpPr>
+      <p:sp>
+        <p:nvSpPr>
+          <p:cNvPr id="2" name="Title 1"/>
+          <p:cNvSpPr>
+            <a:spLocks noGrp="1"/>
+          </p:cNvSpPr>
+          <p:nvPr>
+            <p:ph type="title"/>
+          </p:nvPr>
+        </p:nvSpPr>
+        <p:spPr/>
+        <p:txBody>
+          <a:bodyPr/>
+          <a:lstStyle/>
+          <a:p>
+            <a:r>
+              <a:rPr lang="en-US" dirty="0" smtClean="0"/>
+              <a:t>Dòng lệnh</a:t>
+            </a:r>
+            <a:endParaRPr lang="en-US" dirty="0"/>
+          </a:p>
+        </p:txBody>
+      </p:sp>
+      <p:sp>
+        <p:nvSpPr>
+          <p:cNvPr id="3" name="Content Placeholder 2"/>
+          <p:cNvSpPr>
+            <a:spLocks noGrp="1"/>
+          </p:cNvSpPr>
+          <p:nvPr>
+            <p:ph idx="1"/>
+          </p:nvPr>
+        </p:nvSpPr>
+        <p:spPr/>
+        <p:txBody>
+          <a:bodyPr>
+            <a:normAutofit/>
+          </a:bodyPr>
+          <a:lstStyle/>
+          <a:p>
+            <a:r>
+              <a:rPr lang="en-US" sz="1800" dirty="0" smtClean="0"/>
               <a:t>Các dòng lệnh  if, if-else, if else-if else nên theo mẫu sau:</a:t>
             </a:r>
           </a:p>
@@ -3890,11 +5113,7 @@
           <a:p>
             <a:r>
               <a:rPr lang="en-US" sz="1800" dirty="0" smtClean="0"/>
-              <a:t>Đôi </a:t>
-            </a:r>
-            <a:r>
-              <a:rPr lang="en-US" sz="1800" dirty="0" smtClean="0"/>
-              <a:t>với lệnh if (luôn sử dụng dấu ‘()’) nên tránh mẫu sau:</a:t>
+              <a:t>Đôi với lệnh if (luôn sử dụng dấu ‘()’) nên tránh mẫu sau:</a:t>
             </a:r>
           </a:p>
           <a:p>
@@ -3981,7 +5200,7 @@
 </p:sld>
 </file>
 
-<file path=ppt/slides/slide6.xml><?xml version="1.0" encoding="utf-8"?>
+<file path=ppt/slides/slide7.xml><?xml version="1.0" encoding="utf-8"?>
 <p:sld xmlns:a="http://schemas.openxmlformats.org/drawingml/2006/main" xmlns:r="http://schemas.openxmlformats.org/officeDocument/2006/relationships" xmlns:p="http://schemas.openxmlformats.org/presentationml/2006/main">
   <p:cSld>
     <p:spTree>
@@ -4015,7 +5234,7 @@
           <a:p>
             <a:r>
               <a:rPr lang="en-US" dirty="0" smtClean="0"/>
-              <a:t>Statement</a:t>
+              <a:t>Dòng lệnh</a:t>
             </a:r>
             <a:endParaRPr lang="en-US" dirty="0"/>
           </a:p>
@@ -4058,11 +5277,7 @@
           <a:p>
             <a:r>
               <a:rPr lang="en-US" sz="1800" dirty="0" smtClean="0"/>
-              <a:t>Đối </a:t>
-            </a:r>
-            <a:r>
-              <a:rPr lang="en-US" sz="1800" dirty="0" smtClean="0"/>
-              <a:t>lệnh for mà bên trông không có lệnh khác nên theo mẫu sau :</a:t>
+              <a:t>Đối lệnh for mà bên trông không có lệnh khác nên theo mẫu sau :</a:t>
             </a:r>
           </a:p>
           <a:p>
@@ -4080,13 +5295,8 @@
           <a:p>
             <a:r>
               <a:rPr lang="en-US" sz="1800" dirty="0" smtClean="0"/>
-              <a:t>Đối </a:t>
-            </a:r>
-            <a:r>
-              <a:rPr lang="en-US" sz="1800" dirty="0" smtClean="0"/>
-              <a:t>với mệnh đề initializtion hay mệnh đề update, tránh sử dụng hơn 3 biến để tính toán. </a:t>
-            </a:r>
-            <a:endParaRPr lang="en-US" sz="1800" dirty="0" smtClean="0"/>
+              <a:t>Đối với mệnh đề initializtion hay mệnh đề update, tránh sử dụng hơn 3 biến để tính toán. </a:t>
+            </a:r>
           </a:p>
           <a:p>
             <a:pPr marL="0" indent="0">
@@ -4169,7 +5379,7 @@
 </p:sld>
 </file>
 
-<file path=ppt/slides/slide7.xml><?xml version="1.0" encoding="utf-8"?>
+<file path=ppt/slides/slide8.xml><?xml version="1.0" encoding="utf-8"?>
 <p:sld xmlns:a="http://schemas.openxmlformats.org/drawingml/2006/main" xmlns:r="http://schemas.openxmlformats.org/officeDocument/2006/relationships" xmlns:p="http://schemas.openxmlformats.org/presentationml/2006/main">
   <p:cSld>
     <p:spTree>
@@ -4203,7 +5413,7 @@
           <a:p>
             <a:r>
               <a:rPr lang="en-US" dirty="0" smtClean="0"/>
-              <a:t>Nguồn Tham Khảo</a:t>
+              <a:t>Dòng lệnh</a:t>
             </a:r>
             <a:endParaRPr lang="en-US" dirty="0"/>
           </a:p>
@@ -4221,38 +5431,295 @@
         </p:nvSpPr>
         <p:spPr/>
         <p:txBody>
-          <a:bodyPr/>
-          <a:lstStyle/>
-          <a:p>
-            <a:r>
-              <a:rPr lang="en-US">
-                <a:hlinkClick r:id="rId2"/>
-              </a:rPr>
-              <a:t>http</a:t>
-            </a:r>
-            <a:r>
-              <a:rPr lang="en-US">
-                <a:hlinkClick r:id="rId2"/>
-              </a:rPr>
-              <a:t>://</a:t>
-            </a:r>
-            <a:r>
-              <a:rPr lang="en-US" smtClean="0">
-                <a:hlinkClick r:id="rId2"/>
-              </a:rPr>
-              <a:t>www.oracle.com/technetwork/java/javase/documentation/codeconvtoc-136057.html</a:t>
-            </a:r>
-            <a:endParaRPr lang="en-US" smtClean="0"/>
-          </a:p>
-          <a:p>
-            <a:endParaRPr lang="en-US"/>
-          </a:p>
-        </p:txBody>
-      </p:sp>
+          <a:bodyPr>
+            <a:normAutofit/>
+          </a:bodyPr>
+          <a:lstStyle/>
+          <a:p>
+            <a:r>
+              <a:rPr lang="en-US" sz="1800" dirty="0" smtClean="0"/>
+              <a:t>Dòng lệnh while nên theo mẫu sau:</a:t>
+            </a:r>
+          </a:p>
+          <a:p>
+            <a:endParaRPr lang="en-US" sz="1800" dirty="0" smtClean="0"/>
+          </a:p>
+          <a:p>
+            <a:endParaRPr lang="en-US" sz="1800" dirty="0" smtClean="0"/>
+          </a:p>
+          <a:p>
+            <a:endParaRPr lang="en-US" sz="1800" dirty="0"/>
+          </a:p>
+          <a:p>
+            <a:r>
+              <a:rPr lang="en-US" sz="1800" dirty="0" smtClean="0"/>
+              <a:t>Đối với lệnh while mà bên trong không có lệnh nên theo mẫu sau:</a:t>
+            </a:r>
+          </a:p>
+          <a:p>
+            <a:pPr marL="0" indent="0">
+              <a:buNone/>
+            </a:pPr>
+            <a:r>
+              <a:rPr lang="en-US" sz="1800" dirty="0" smtClean="0"/>
+              <a:t>	while (condition) ;</a:t>
+            </a:r>
+          </a:p>
+          <a:p>
+            <a:r>
+              <a:rPr lang="en-US" sz="1800" dirty="0" smtClean="0"/>
+              <a:t>Lệnh do-while nên theo mẫu sau:</a:t>
+            </a:r>
+          </a:p>
+          <a:p>
+            <a:pPr marL="0" indent="0">
+              <a:buNone/>
+            </a:pPr>
+            <a:endParaRPr lang="en-US" sz="1800" dirty="0"/>
+          </a:p>
+        </p:txBody>
+      </p:sp>
+      <p:pic>
+        <p:nvPicPr>
+          <p:cNvPr id="4" name="Picture 3"/>
+          <p:cNvPicPr>
+            <a:picLocks noChangeAspect="1"/>
+          </p:cNvPicPr>
+          <p:nvPr/>
+        </p:nvPicPr>
+        <p:blipFill>
+          <a:blip r:embed="rId2">
+            <a:extLst>
+              <a:ext uri="{28A0092B-C50C-407E-A947-70E740481C1C}">
+                <a14:useLocalDpi xmlns:a14="http://schemas.microsoft.com/office/drawing/2010/main" val="0"/>
+              </a:ext>
+            </a:extLst>
+          </a:blip>
+          <a:stretch>
+            <a:fillRect/>
+          </a:stretch>
+        </p:blipFill>
+        <p:spPr>
+          <a:xfrm>
+            <a:off x="1066800" y="1981200"/>
+            <a:ext cx="2362200" cy="899161"/>
+          </a:xfrm>
+          <a:prstGeom prst="rect">
+            <a:avLst/>
+          </a:prstGeom>
+        </p:spPr>
+      </p:pic>
+      <p:pic>
+        <p:nvPicPr>
+          <p:cNvPr id="5" name="Picture 4"/>
+          <p:cNvPicPr>
+            <a:picLocks noChangeAspect="1"/>
+          </p:cNvPicPr>
+          <p:nvPr/>
+        </p:nvPicPr>
+        <p:blipFill>
+          <a:blip r:embed="rId3">
+            <a:extLst>
+              <a:ext uri="{28A0092B-C50C-407E-A947-70E740481C1C}">
+                <a14:useLocalDpi xmlns:a14="http://schemas.microsoft.com/office/drawing/2010/main" val="0"/>
+              </a:ext>
+            </a:extLst>
+          </a:blip>
+          <a:stretch>
+            <a:fillRect/>
+          </a:stretch>
+        </p:blipFill>
+        <p:spPr>
+          <a:xfrm>
+            <a:off x="1447800" y="4114800"/>
+            <a:ext cx="2614529" cy="982767"/>
+          </a:xfrm>
+          <a:prstGeom prst="rect">
+            <a:avLst/>
+          </a:prstGeom>
+        </p:spPr>
+      </p:pic>
     </p:spTree>
     <p:extLst>
       <p:ext uri="{BB962C8B-B14F-4D97-AF65-F5344CB8AC3E}">
-        <p14:creationId xmlns:p14="http://schemas.microsoft.com/office/powerpoint/2010/main" val="961866178"/>
+        <p14:creationId xmlns:p14="http://schemas.microsoft.com/office/powerpoint/2010/main" val="404502925"/>
+      </p:ext>
+    </p:extLst>
+  </p:cSld>
+  <p:clrMapOvr>
+    <a:masterClrMapping/>
+  </p:clrMapOvr>
+</p:sld>
+</file>
+
+<file path=ppt/slides/slide9.xml><?xml version="1.0" encoding="utf-8"?>
+<p:sld xmlns:a="http://schemas.openxmlformats.org/drawingml/2006/main" xmlns:r="http://schemas.openxmlformats.org/officeDocument/2006/relationships" xmlns:p="http://schemas.openxmlformats.org/presentationml/2006/main">
+  <p:cSld>
+    <p:spTree>
+      <p:nvGrpSpPr>
+        <p:cNvPr id="1" name=""/>
+        <p:cNvGrpSpPr/>
+        <p:nvPr/>
+      </p:nvGrpSpPr>
+      <p:grpSpPr>
+        <a:xfrm>
+          <a:off x="0" y="0"/>
+          <a:ext cx="0" cy="0"/>
+          <a:chOff x="0" y="0"/>
+          <a:chExt cx="0" cy="0"/>
+        </a:xfrm>
+      </p:grpSpPr>
+      <p:sp>
+        <p:nvSpPr>
+          <p:cNvPr id="2" name="Title 1"/>
+          <p:cNvSpPr>
+            <a:spLocks noGrp="1"/>
+          </p:cNvSpPr>
+          <p:nvPr>
+            <p:ph type="title"/>
+          </p:nvPr>
+        </p:nvSpPr>
+        <p:spPr/>
+        <p:txBody>
+          <a:bodyPr/>
+          <a:lstStyle/>
+          <a:p>
+            <a:r>
+              <a:rPr lang="en-US" dirty="0" smtClean="0"/>
+              <a:t>Khoảng trắng</a:t>
+            </a:r>
+            <a:endParaRPr lang="en-US" dirty="0"/>
+          </a:p>
+        </p:txBody>
+      </p:sp>
+      <p:sp>
+        <p:nvSpPr>
+          <p:cNvPr id="3" name="Content Placeholder 2"/>
+          <p:cNvSpPr>
+            <a:spLocks noGrp="1"/>
+          </p:cNvSpPr>
+          <p:nvPr>
+            <p:ph idx="1"/>
+          </p:nvPr>
+        </p:nvSpPr>
+        <p:spPr/>
+        <p:txBody>
+          <a:bodyPr>
+            <a:normAutofit/>
+          </a:bodyPr>
+          <a:lstStyle/>
+          <a:p>
+            <a:r>
+              <a:rPr lang="en-US" sz="1800" dirty="0" smtClean="0"/>
+              <a:t>Ta nên sử dụng dòng trống để ngăn cách giữa các phần trong mã nguồn, việc này giúp cho mã nguồn dễ đọc hơn.</a:t>
+            </a:r>
+          </a:p>
+          <a:p>
+            <a:r>
+              <a:rPr lang="en-US" sz="1800" dirty="0" smtClean="0"/>
+              <a:t>Nên sử dụng dòng trống trong các trường hợp sau:</a:t>
+            </a:r>
+            <a:endParaRPr lang="en-US" sz="1800" dirty="0"/>
+          </a:p>
+          <a:p>
+            <a:pPr lvl="1"/>
+            <a:r>
+              <a:rPr lang="en-US" sz="1400" dirty="0" smtClean="0"/>
+              <a:t>Sừ dụng hai dòng trống giữa class và interface:</a:t>
+            </a:r>
+          </a:p>
+          <a:p>
+            <a:pPr lvl="1"/>
+            <a:r>
+              <a:rPr lang="en-US" sz="1400" dirty="0" smtClean="0"/>
+              <a:t>Nên 				Không Nên</a:t>
+            </a:r>
+            <a:endParaRPr lang="en-US" sz="1800" dirty="0" smtClean="0"/>
+          </a:p>
+          <a:p>
+            <a:endParaRPr lang="en-US" sz="1800" dirty="0"/>
+          </a:p>
+          <a:p>
+            <a:endParaRPr lang="en-US" sz="1800" dirty="0" smtClean="0"/>
+          </a:p>
+          <a:p>
+            <a:endParaRPr lang="en-US" sz="1800" dirty="0"/>
+          </a:p>
+          <a:p>
+            <a:endParaRPr lang="en-US" sz="1800" dirty="0" smtClean="0"/>
+          </a:p>
+          <a:p>
+            <a:endParaRPr lang="en-US" sz="1800" dirty="0" smtClean="0"/>
+          </a:p>
+          <a:p>
+            <a:endParaRPr lang="en-US" sz="1400" dirty="0" smtClean="0"/>
+          </a:p>
+        </p:txBody>
+      </p:sp>
+      <p:pic>
+        <p:nvPicPr>
+          <p:cNvPr id="4" name="Picture 3"/>
+          <p:cNvPicPr>
+            <a:picLocks noChangeAspect="1"/>
+          </p:cNvPicPr>
+          <p:nvPr/>
+        </p:nvPicPr>
+        <p:blipFill>
+          <a:blip r:embed="rId2">
+            <a:extLst>
+              <a:ext uri="{28A0092B-C50C-407E-A947-70E740481C1C}">
+                <a14:useLocalDpi xmlns:a14="http://schemas.microsoft.com/office/drawing/2010/main" val="0"/>
+              </a:ext>
+            </a:extLst>
+          </a:blip>
+          <a:stretch>
+            <a:fillRect/>
+          </a:stretch>
+        </p:blipFill>
+        <p:spPr>
+          <a:xfrm>
+            <a:off x="1143000" y="3352799"/>
+            <a:ext cx="2667000" cy="1836075"/>
+          </a:xfrm>
+          <a:prstGeom prst="rect">
+            <a:avLst/>
+          </a:prstGeom>
+        </p:spPr>
+      </p:pic>
+      <p:pic>
+        <p:nvPicPr>
+          <p:cNvPr id="5" name="Picture 4"/>
+          <p:cNvPicPr>
+            <a:picLocks noChangeAspect="1"/>
+          </p:cNvPicPr>
+          <p:nvPr/>
+        </p:nvPicPr>
+        <p:blipFill>
+          <a:blip r:embed="rId3">
+            <a:extLst>
+              <a:ext uri="{28A0092B-C50C-407E-A947-70E740481C1C}">
+                <a14:useLocalDpi xmlns:a14="http://schemas.microsoft.com/office/drawing/2010/main" val="0"/>
+              </a:ext>
+            </a:extLst>
+          </a:blip>
+          <a:stretch>
+            <a:fillRect/>
+          </a:stretch>
+        </p:blipFill>
+        <p:spPr>
+          <a:xfrm>
+            <a:off x="4876799" y="3352800"/>
+            <a:ext cx="2628899" cy="1752600"/>
+          </a:xfrm>
+          <a:prstGeom prst="rect">
+            <a:avLst/>
+          </a:prstGeom>
+        </p:spPr>
+      </p:pic>
+    </p:spTree>
+    <p:extLst>
+      <p:ext uri="{BB962C8B-B14F-4D97-AF65-F5344CB8AC3E}">
+        <p14:creationId xmlns:p14="http://schemas.microsoft.com/office/powerpoint/2010/main" val="1594840936"/>
       </p:ext>
     </p:extLst>
   </p:cSld>

</xml_diff>